<commit_message>
more refactoring and fixing the copyfile function
</commit_message>
<xml_diff>
--- a/finished_reports/Applebee's.pptx
+++ b/finished_reports/Applebee's.pptx
@@ -12678,16 +12678,6 @@
             <a:r>
               <a:t>Olive Garden</a:t>
             </a:r>
-            <a:r>
-              <a:rPr b="1"/>
-              <a:t>8.1%</a:t>
-            </a:r>
-            <a:r>
-              <a:t> considered visiting </a:t>
-            </a:r>
-            <a:r>
-              <a:t>Olive Garden</a:t>
-            </a:r>
           </a:p>
         </p:txBody>
       </p:sp>

</xml_diff>